<commit_message>
Moved loadHighscores() inside initializeLevel(); Edited presentation;
</commit_message>
<xml_diff>
--- a/Frogger.pptx
+++ b/Frogger.pptx
@@ -8233,8 +8233,33 @@
             </a:r>
             <a:r>
               <a:rPr lang="en-US" sz="2000" dirty="0" smtClean="0"/>
-              <a:t>Yorgakiev (Evgeni.Yorgakiev)</a:t>
-            </a:r>
+              <a:t>Yorgakiev (Evgeni.Yorgakiev</a:t>
+            </a:r>
+            <a:r>
+              <a:rPr lang="en-US" sz="2000" dirty="0" smtClean="0"/>
+              <a:t>)</a:t>
+            </a:r>
+          </a:p>
+          <a:p>
+            <a:r>
+              <a:rPr lang="en-US" sz="2000" dirty="0"/>
+              <a:t>Gabriela Geneva (Gabbs</a:t>
+            </a:r>
+            <a:r>
+              <a:rPr lang="en-US" sz="2000" dirty="0" smtClean="0"/>
+              <a:t>)</a:t>
+            </a:r>
+          </a:p>
+          <a:p>
+            <a:r>
+              <a:rPr lang="en-US" sz="2000" dirty="0"/>
+              <a:t>Valentin Kolev (valentinkolev</a:t>
+            </a:r>
+            <a:r>
+              <a:rPr lang="en-US" sz="2000" dirty="0" smtClean="0"/>
+              <a:t>)</a:t>
+            </a:r>
+            <a:endParaRPr lang="en-US" sz="2000" dirty="0" smtClean="0"/>
           </a:p>
           <a:p>
             <a:r>
@@ -8245,20 +8270,17 @@
           <a:p>
             <a:r>
               <a:rPr lang="en-US" sz="2000" dirty="0" smtClean="0"/>
-              <a:t>Gabriela Geneva (Gabbs)</a:t>
-            </a:r>
-          </a:p>
-          <a:p>
+              <a:t>Zdravko </a:t>
+            </a:r>
             <a:r>
               <a:rPr lang="en-US" sz="2000" dirty="0" smtClean="0"/>
-              <a:t>Zdravko Georgiev (IceElementor)</a:t>
-            </a:r>
-          </a:p>
-          <a:p>
+              <a:t>Georgiev (IceElementor</a:t>
+            </a:r>
             <a:r>
               <a:rPr lang="en-US" sz="2000" dirty="0" smtClean="0"/>
-              <a:t>Valentin Kolev (valentinkolev)</a:t>
-            </a:r>
+              <a:t>)</a:t>
+            </a:r>
+            <a:endParaRPr lang="en-US" sz="2000" dirty="0" smtClean="0"/>
           </a:p>
         </p:txBody>
       </p:sp>
@@ -8344,7 +8366,11 @@
           <a:p>
             <a:r>
               <a:rPr lang="en-US" sz="2000" dirty="0" smtClean="0"/>
-              <a:t>A fun game, where you take control of a frog</a:t>
+              <a:t>Fun game</a:t>
+            </a:r>
+            <a:r>
+              <a:rPr lang="en-US" sz="2000" dirty="0" smtClean="0"/>
+              <a:t>, where you take control of a frog</a:t>
             </a:r>
           </a:p>
           <a:p>
@@ -8356,9 +8382,9 @@
           <a:p>
             <a:r>
               <a:rPr lang="en-US" sz="2000" dirty="0" smtClean="0"/>
-              <a:t>Different levels</a:t>
-            </a:r>
-            <a:endParaRPr lang="en-US" dirty="0" smtClean="0"/>
+              <a:t>Highscores and different levels</a:t>
+            </a:r>
+            <a:endParaRPr lang="en-US" sz="2000" dirty="0" smtClean="0"/>
           </a:p>
         </p:txBody>
       </p:sp>
@@ -8510,49 +8536,61 @@
             </a:r>
             <a:r>
               <a:rPr lang="en-US" sz="2000" dirty="0" smtClean="0"/>
-              <a:t>– game </a:t>
+              <a:t>– core architecture and design, </a:t>
             </a:r>
             <a:r>
               <a:rPr lang="en-US" sz="2000" dirty="0" smtClean="0"/>
-              <a:t>core, levels</a:t>
-            </a:r>
-          </a:p>
-          <a:p>
+              <a:t>levels</a:t>
+            </a:r>
+          </a:p>
+          <a:p>
+            <a:r>
+              <a:rPr lang="en-US" sz="2000" dirty="0"/>
+              <a:t>Gabriela – save/load, highscores, pop-ups, </a:t>
+            </a:r>
             <a:r>
               <a:rPr lang="en-US" sz="2000" dirty="0" smtClean="0"/>
-              <a:t> Valentin </a:t>
+              <a:t>levels</a:t>
+            </a:r>
+          </a:p>
+          <a:p>
+            <a:r>
+              <a:rPr lang="en-US" sz="2000" dirty="0"/>
+              <a:t>Valentin K. – initial, pause and highscores </a:t>
             </a:r>
             <a:r>
               <a:rPr lang="en-US" sz="2000" dirty="0" smtClean="0"/>
-              <a:t>M. – sprites and textures</a:t>
+              <a:t>menus</a:t>
+            </a:r>
+            <a:endParaRPr lang="en-US" sz="2000" dirty="0" smtClean="0"/>
+          </a:p>
+          <a:p>
+            <a:r>
+              <a:rPr lang="en-US" sz="2000" dirty="0" smtClean="0"/>
+              <a:t>Valentin M. – sprites and </a:t>
+            </a:r>
+            <a:r>
+              <a:rPr lang="en-US" sz="2000" dirty="0" smtClean="0"/>
+              <a:t>textures, water rows</a:t>
             </a:r>
             <a:endParaRPr lang="en-US" sz="2000" dirty="0"/>
           </a:p>
           <a:p>
             <a:r>
-              <a:rPr lang="en-US" sz="2000" dirty="0"/>
-              <a:t>Gabriela </a:t>
-            </a:r>
-            <a:r>
               <a:rPr lang="en-US" sz="2000" dirty="0" smtClean="0"/>
-              <a:t>– save/load, pop-ups, levels</a:t>
-            </a:r>
-            <a:endParaRPr lang="en-US" sz="2000" dirty="0"/>
-          </a:p>
-          <a:p>
-            <a:r>
-              <a:rPr lang="en-US" sz="2000" dirty="0"/>
               <a:t>Zdravko </a:t>
             </a:r>
             <a:r>
               <a:rPr lang="en-US" sz="2000" dirty="0" smtClean="0"/>
-              <a:t>– win condition and level progress</a:t>
-            </a:r>
-          </a:p>
-          <a:p>
+              <a:t>– win </a:t>
+            </a:r>
             <a:r>
               <a:rPr lang="en-US" sz="2000" dirty="0" smtClean="0"/>
-              <a:t>Valentin K. – initial and ingame menu</a:t>
+              <a:t>condition, level </a:t>
+            </a:r>
+            <a:r>
+              <a:rPr lang="en-US" sz="2000" dirty="0" smtClean="0"/>
+              <a:t>progressing</a:t>
             </a:r>
           </a:p>
           <a:p>

</xml_diff>